<commit_message>
FIrst cut of the revised many lectures
</commit_message>
<xml_diff>
--- a/lectures/DJ-02-Model-Single.pptx
+++ b/lectures/DJ-02-Model-Single.pptx
@@ -4307,7 +4307,7 @@
         </p:nvSpPr>
         <p:spPr>
           <a:xfrm>
-            <a:off x="2800350" y="1348937"/>
+            <a:off x="2757488" y="1690688"/>
             <a:ext cx="7077579" cy="2862322"/>
           </a:xfrm>
           <a:prstGeom prst="rect">
@@ -5782,7 +5782,7 @@
         </p:nvSpPr>
         <p:spPr>
           <a:xfrm>
-            <a:off x="3259198" y="6311900"/>
+            <a:off x="4060286" y="5640389"/>
             <a:ext cx="6781280" cy="369332"/>
           </a:xfrm>
           <a:prstGeom prst="rect">

</xml_diff>

<commit_message>
Add stuff to DJ-02
</commit_message>
<xml_diff>
--- a/lectures/DJ-02-Model-Single.pptx
+++ b/lectures/DJ-02-Model-Single.pptx
@@ -5,7 +5,7 @@
     <p:sldMasterId id="2147483660" r:id="rId1"/>
   </p:sldMasterIdLst>
   <p:notesMasterIdLst>
-    <p:notesMasterId r:id="rId24"/>
+    <p:notesMasterId r:id="rId23"/>
   </p:notesMasterIdLst>
   <p:sldIdLst>
     <p:sldId id="258" r:id="rId2"/>
@@ -27,9 +27,8 @@
     <p:sldId id="341" r:id="rId18"/>
     <p:sldId id="342" r:id="rId19"/>
     <p:sldId id="343" r:id="rId20"/>
-    <p:sldId id="333" r:id="rId21"/>
-    <p:sldId id="332" r:id="rId22"/>
-    <p:sldId id="273" r:id="rId23"/>
+    <p:sldId id="332" r:id="rId21"/>
+    <p:sldId id="273" r:id="rId22"/>
   </p:sldIdLst>
   <p:sldSz cx="12192000" cy="6858000"/>
   <p:notesSz cx="6858000" cy="9144000"/>
@@ -3843,10 +3842,10 @@
           <p:cNvPr id="10" name="Rectangle 9">
             <a:extLst>
               <a:ext uri="{FF2B5EF4-FFF2-40B4-BE49-F238E27FC236}">
-                <a16:creationId xmlns="" xmlns:a16="http://schemas.microsoft.com/office/drawing/2014/main" id="{E20EB187-900F-4AF5-813B-101456D9FD39}"/>
+                <a16:creationId xmlns:a16="http://schemas.microsoft.com/office/drawing/2014/main" xmlns="" id="{E20EB187-900F-4AF5-813B-101456D9FD39}"/>
               </a:ext>
               <a:ext uri="{C183D7F6-B498-43B3-948B-1728B52AA6E4}">
-                <adec:decorative xmlns="" xmlns:adec="http://schemas.microsoft.com/office/drawing/2017/decorative" val="1"/>
+                <adec:decorative xmlns:adec="http://schemas.microsoft.com/office/drawing/2017/decorative" xmlns="" val="1"/>
               </a:ext>
             </a:extLst>
           </p:cNvPr>
@@ -3990,10 +3989,10 @@
           <p:cNvPr id="12" name="Straight Connector 11">
             <a:extLst>
               <a:ext uri="{FF2B5EF4-FFF2-40B4-BE49-F238E27FC236}">
-                <a16:creationId xmlns="" xmlns:a16="http://schemas.microsoft.com/office/drawing/2014/main" id="{624D17C8-E9C2-48A4-AA36-D7048A6CCC41}"/>
+                <a16:creationId xmlns:a16="http://schemas.microsoft.com/office/drawing/2014/main" xmlns="" id="{624D17C8-E9C2-48A4-AA36-D7048A6CCC41}"/>
               </a:ext>
               <a:ext uri="{C183D7F6-B498-43B3-948B-1728B52AA6E4}">
-                <adec:decorative xmlns="" xmlns:adec="http://schemas.microsoft.com/office/drawing/2017/decorative" val="1"/>
+                <adec:decorative xmlns:adec="http://schemas.microsoft.com/office/drawing/2017/decorative" xmlns="" val="1"/>
               </a:ext>
             </a:extLst>
           </p:cNvPr>
@@ -11608,96 +11607,6 @@
       </p:grpSpPr>
       <p:sp>
         <p:nvSpPr>
-          <p:cNvPr id="2" name="Title 1"/>
-          <p:cNvSpPr>
-            <a:spLocks noGrp="1"/>
-          </p:cNvSpPr>
-          <p:nvPr>
-            <p:ph type="title"/>
-          </p:nvPr>
-        </p:nvSpPr>
-        <p:spPr/>
-        <p:txBody>
-          <a:bodyPr/>
-          <a:lstStyle/>
-          <a:p>
-            <a:r>
-              <a:rPr lang="en-US" dirty="0" smtClean="0"/>
-              <a:t>Demo</a:t>
-            </a:r>
-            <a:endParaRPr lang="en-US" dirty="0"/>
-          </a:p>
-        </p:txBody>
-      </p:sp>
-      <p:sp>
-        <p:nvSpPr>
-          <p:cNvPr id="3" name="Text Placeholder 2"/>
-          <p:cNvSpPr>
-            <a:spLocks noGrp="1"/>
-          </p:cNvSpPr>
-          <p:nvPr>
-            <p:ph type="body" idx="1"/>
-          </p:nvPr>
-        </p:nvSpPr>
-        <p:spPr/>
-        <p:txBody>
-          <a:bodyPr/>
-          <a:lstStyle/>
-          <a:p>
-            <a:r>
-              <a:rPr lang="en-US" dirty="0"/>
-              <a:t>https://</a:t>
-            </a:r>
-            <a:r>
-              <a:rPr lang="en-US" dirty="0" smtClean="0"/>
-              <a:t>www.dj4e.com/lectures/DJ-03-Model-Single.txt</a:t>
-            </a:r>
-            <a:endParaRPr lang="en-US" dirty="0"/>
-          </a:p>
-          <a:p>
-            <a:endParaRPr lang="en-US" dirty="0"/>
-          </a:p>
-        </p:txBody>
-      </p:sp>
-    </p:spTree>
-    <p:extLst>
-      <p:ext uri="{BB962C8B-B14F-4D97-AF65-F5344CB8AC3E}">
-        <p14:creationId xmlns:p14="http://schemas.microsoft.com/office/powerpoint/2010/main" val="495488396"/>
-      </p:ext>
-    </p:extLst>
-  </p:cSld>
-  <p:clrMapOvr>
-    <a:masterClrMapping/>
-  </p:clrMapOvr>
-  <p:timing>
-    <p:tnLst>
-      <p:par>
-        <p:cTn id="1" dur="indefinite" restart="never" nodeType="tmRoot"/>
-      </p:par>
-    </p:tnLst>
-  </p:timing>
-</p:sld>
-</file>
-
-<file path=ppt/slides/slide21.xml><?xml version="1.0" encoding="utf-8"?>
-<p:sld xmlns:a="http://schemas.openxmlformats.org/drawingml/2006/main" xmlns:r="http://schemas.openxmlformats.org/officeDocument/2006/relationships" xmlns:p="http://schemas.openxmlformats.org/presentationml/2006/main">
-  <p:cSld>
-    <p:spTree>
-      <p:nvGrpSpPr>
-        <p:cNvPr id="1" name=""/>
-        <p:cNvGrpSpPr/>
-        <p:nvPr/>
-      </p:nvGrpSpPr>
-      <p:grpSpPr>
-        <a:xfrm>
-          <a:off x="0" y="0"/>
-          <a:ext cx="0" cy="0"/>
-          <a:chOff x="0" y="0"/>
-          <a:chExt cx="0" cy="0"/>
-        </a:xfrm>
-      </p:grpSpPr>
-      <p:sp>
-        <p:nvSpPr>
           <p:cNvPr id="3" name="Title 2"/>
           <p:cNvSpPr>
             <a:spLocks noGrp="1"/>
@@ -11803,7 +11712,7 @@
 </p:sld>
 </file>
 
-<file path=ppt/slides/slide22.xml><?xml version="1.0" encoding="utf-8"?>
+<file path=ppt/slides/slide21.xml><?xml version="1.0" encoding="utf-8"?>
 <p:sld xmlns:a="http://schemas.openxmlformats.org/drawingml/2006/main" xmlns:r="http://schemas.openxmlformats.org/officeDocument/2006/relationships" xmlns:p="http://schemas.openxmlformats.org/presentationml/2006/main">
   <p:cSld>
     <p:spTree>

</xml_diff>

<commit_message>
Add some of the MVC and View lectures
</commit_message>
<xml_diff>
--- a/lectures/DJ-02-Model-Single.pptx
+++ b/lectures/DJ-02-Model-Single.pptx
@@ -217,7 +217,7 @@
           <a:p>
             <a:fld id="{C97B56FC-7D2E-F343-9D09-0D14B00AA564}" type="datetimeFigureOut">
               <a:rPr lang="en-US" smtClean="0"/>
-              <a:t>9/20/19</a:t>
+              <a:t>9/25/19</a:t>
             </a:fld>
             <a:endParaRPr lang="en-US"/>
           </a:p>
@@ -1154,7 +1154,7 @@
           <a:p>
             <a:fld id="{EEE7C04C-7AF8-1445-A186-502B631B934F}" type="datetimeFigureOut">
               <a:rPr lang="en-US" smtClean="0"/>
-              <a:t>9/20/19</a:t>
+              <a:t>9/25/19</a:t>
             </a:fld>
             <a:endParaRPr lang="en-US"/>
           </a:p>
@@ -1319,7 +1319,7 @@
           <a:p>
             <a:fld id="{EEE7C04C-7AF8-1445-A186-502B631B934F}" type="datetimeFigureOut">
               <a:rPr lang="en-US" smtClean="0"/>
-              <a:t>9/20/19</a:t>
+              <a:t>9/25/19</a:t>
             </a:fld>
             <a:endParaRPr lang="en-US"/>
           </a:p>
@@ -1494,7 +1494,7 @@
           <a:p>
             <a:fld id="{EEE7C04C-7AF8-1445-A186-502B631B934F}" type="datetimeFigureOut">
               <a:rPr lang="en-US" smtClean="0"/>
-              <a:t>9/20/19</a:t>
+              <a:t>9/25/19</a:t>
             </a:fld>
             <a:endParaRPr lang="en-US"/>
           </a:p>
@@ -1659,7 +1659,7 @@
           <a:p>
             <a:fld id="{EEE7C04C-7AF8-1445-A186-502B631B934F}" type="datetimeFigureOut">
               <a:rPr lang="en-US" smtClean="0"/>
-              <a:t>9/20/19</a:t>
+              <a:t>9/25/19</a:t>
             </a:fld>
             <a:endParaRPr lang="en-US"/>
           </a:p>
@@ -1900,7 +1900,7 @@
           <a:p>
             <a:fld id="{EEE7C04C-7AF8-1445-A186-502B631B934F}" type="datetimeFigureOut">
               <a:rPr lang="en-US" smtClean="0"/>
-              <a:t>9/20/19</a:t>
+              <a:t>9/25/19</a:t>
             </a:fld>
             <a:endParaRPr lang="en-US"/>
           </a:p>
@@ -2127,7 +2127,7 @@
           <a:p>
             <a:fld id="{EEE7C04C-7AF8-1445-A186-502B631B934F}" type="datetimeFigureOut">
               <a:rPr lang="en-US" smtClean="0"/>
-              <a:t>9/20/19</a:t>
+              <a:t>9/25/19</a:t>
             </a:fld>
             <a:endParaRPr lang="en-US"/>
           </a:p>
@@ -2489,7 +2489,7 @@
           <a:p>
             <a:fld id="{EEE7C04C-7AF8-1445-A186-502B631B934F}" type="datetimeFigureOut">
               <a:rPr lang="en-US" smtClean="0"/>
-              <a:t>9/20/19</a:t>
+              <a:t>9/25/19</a:t>
             </a:fld>
             <a:endParaRPr lang="en-US"/>
           </a:p>
@@ -2602,7 +2602,7 @@
           <a:p>
             <a:fld id="{EEE7C04C-7AF8-1445-A186-502B631B934F}" type="datetimeFigureOut">
               <a:rPr lang="en-US" smtClean="0"/>
-              <a:t>9/20/19</a:t>
+              <a:t>9/25/19</a:t>
             </a:fld>
             <a:endParaRPr lang="en-US"/>
           </a:p>
@@ -2692,7 +2692,7 @@
           <a:p>
             <a:fld id="{EEE7C04C-7AF8-1445-A186-502B631B934F}" type="datetimeFigureOut">
               <a:rPr lang="en-US" smtClean="0"/>
-              <a:t>9/20/19</a:t>
+              <a:t>9/25/19</a:t>
             </a:fld>
             <a:endParaRPr lang="en-US"/>
           </a:p>
@@ -2964,7 +2964,7 @@
           <a:p>
             <a:fld id="{EEE7C04C-7AF8-1445-A186-502B631B934F}" type="datetimeFigureOut">
               <a:rPr lang="en-US" smtClean="0"/>
-              <a:t>9/20/19</a:t>
+              <a:t>9/25/19</a:t>
             </a:fld>
             <a:endParaRPr lang="en-US"/>
           </a:p>
@@ -3216,7 +3216,7 @@
           <a:p>
             <a:fld id="{EEE7C04C-7AF8-1445-A186-502B631B934F}" type="datetimeFigureOut">
               <a:rPr lang="en-US" smtClean="0"/>
-              <a:t>9/20/19</a:t>
+              <a:t>9/25/19</a:t>
             </a:fld>
             <a:endParaRPr lang="en-US"/>
           </a:p>
@@ -3424,7 +3424,7 @@
           <a:p>
             <a:fld id="{EEE7C04C-7AF8-1445-A186-502B631B934F}" type="datetimeFigureOut">
               <a:rPr lang="en-US" smtClean="0"/>
-              <a:t>9/20/19</a:t>
+              <a:t>9/25/19</a:t>
             </a:fld>
             <a:endParaRPr lang="en-US"/>
           </a:p>
@@ -3842,10 +3842,10 @@
           <p:cNvPr id="10" name="Rectangle 9">
             <a:extLst>
               <a:ext uri="{FF2B5EF4-FFF2-40B4-BE49-F238E27FC236}">
-                <a16:creationId xmlns:a16="http://schemas.microsoft.com/office/drawing/2014/main" xmlns="" id="{E20EB187-900F-4AF5-813B-101456D9FD39}"/>
+                <a16:creationId xmlns="" xmlns:a16="http://schemas.microsoft.com/office/drawing/2014/main" id="{E20EB187-900F-4AF5-813B-101456D9FD39}"/>
               </a:ext>
               <a:ext uri="{C183D7F6-B498-43B3-948B-1728B52AA6E4}">
-                <adec:decorative xmlns:adec="http://schemas.microsoft.com/office/drawing/2017/decorative" xmlns="" val="1"/>
+                <adec:decorative xmlns="" xmlns:adec="http://schemas.microsoft.com/office/drawing/2017/decorative" val="1"/>
               </a:ext>
             </a:extLst>
           </p:cNvPr>
@@ -3989,10 +3989,10 @@
           <p:cNvPr id="12" name="Straight Connector 11">
             <a:extLst>
               <a:ext uri="{FF2B5EF4-FFF2-40B4-BE49-F238E27FC236}">
-                <a16:creationId xmlns:a16="http://schemas.microsoft.com/office/drawing/2014/main" xmlns="" id="{624D17C8-E9C2-48A4-AA36-D7048A6CCC41}"/>
+                <a16:creationId xmlns="" xmlns:a16="http://schemas.microsoft.com/office/drawing/2014/main" id="{624D17C8-E9C2-48A4-AA36-D7048A6CCC41}"/>
               </a:ext>
               <a:ext uri="{C183D7F6-B498-43B3-948B-1728B52AA6E4}">
-                <adec:decorative xmlns:adec="http://schemas.microsoft.com/office/drawing/2017/decorative" xmlns="" val="1"/>
+                <adec:decorative xmlns="" xmlns:adec="http://schemas.microsoft.com/office/drawing/2017/decorative" val="1"/>
               </a:ext>
             </a:extLst>
           </p:cNvPr>
@@ -11549,6 +11549,83 @@
           <a:ln w="38100">
             <a:solidFill>
               <a:srgbClr val="FFFF00"/>
+            </a:solidFill>
+            <a:tailEnd type="triangle"/>
+          </a:ln>
+        </p:spPr>
+        <p:style>
+          <a:lnRef idx="1">
+            <a:schemeClr val="accent1"/>
+          </a:lnRef>
+          <a:fillRef idx="0">
+            <a:schemeClr val="accent1"/>
+          </a:fillRef>
+          <a:effectRef idx="0">
+            <a:schemeClr val="accent1"/>
+          </a:effectRef>
+          <a:fontRef idx="minor">
+            <a:schemeClr val="tx1"/>
+          </a:fontRef>
+        </p:style>
+      </p:cxnSp>
+      <p:cxnSp>
+        <p:nvCxnSpPr>
+          <p:cNvPr id="48" name="Straight Arrow Connector 47"/>
+          <p:cNvCxnSpPr>
+            <a:stCxn id="14" idx="3"/>
+            <a:endCxn id="13" idx="2"/>
+          </p:cNvCxnSpPr>
+          <p:nvPr/>
+        </p:nvCxnSpPr>
+        <p:spPr>
+          <a:xfrm flipV="1">
+            <a:off x="9815644" y="3421029"/>
+            <a:ext cx="957940" cy="294921"/>
+          </a:xfrm>
+          <a:prstGeom prst="straightConnector1">
+            <a:avLst/>
+          </a:prstGeom>
+          <a:ln w="38100">
+            <a:solidFill>
+              <a:schemeClr val="tx1"/>
+            </a:solidFill>
+            <a:tailEnd type="triangle"/>
+          </a:ln>
+        </p:spPr>
+        <p:style>
+          <a:lnRef idx="1">
+            <a:schemeClr val="accent1"/>
+          </a:lnRef>
+          <a:fillRef idx="0">
+            <a:schemeClr val="accent1"/>
+          </a:fillRef>
+          <a:effectRef idx="0">
+            <a:schemeClr val="accent1"/>
+          </a:effectRef>
+          <a:fontRef idx="minor">
+            <a:schemeClr val="tx1"/>
+          </a:fontRef>
+        </p:style>
+      </p:cxnSp>
+      <p:cxnSp>
+        <p:nvCxnSpPr>
+          <p:cNvPr id="52" name="Straight Arrow Connector 51"/>
+          <p:cNvCxnSpPr>
+            <a:endCxn id="14" idx="2"/>
+          </p:cNvCxnSpPr>
+          <p:nvPr/>
+        </p:nvCxnSpPr>
+        <p:spPr>
+          <a:xfrm flipV="1">
+            <a:off x="8664626" y="3966793"/>
+            <a:ext cx="473108" cy="433623"/>
+          </a:xfrm>
+          <a:prstGeom prst="straightConnector1">
+            <a:avLst/>
+          </a:prstGeom>
+          <a:ln w="38100">
+            <a:solidFill>
+              <a:schemeClr val="tx1"/>
             </a:solidFill>
             <a:tailEnd type="triangle"/>
           </a:ln>

</xml_diff>

<commit_message>
Move 4.0 -> 4.2
</commit_message>
<xml_diff>
--- a/lectures/DJ-02-Model-Single.pptx
+++ b/lectures/DJ-02-Model-Single.pptx
@@ -217,7 +217,7 @@
           <a:p>
             <a:fld id="{C97B56FC-7D2E-F343-9D09-0D14B00AA564}" type="datetimeFigureOut">
               <a:rPr lang="en-US" smtClean="0"/>
-              <a:t>9/16/22</a:t>
+              <a:t>7/8/23</a:t>
             </a:fld>
             <a:endParaRPr lang="en-US"/>
           </a:p>
@@ -530,7 +530,7 @@
               </a14:hiddenFill>
             </a:ext>
             <a:ext uri="{FAA26D3D-D897-4be2-8F04-BA451C77F1D7}">
-              <ma14:placeholderFlag xmlns:ma14="http://schemas.microsoft.com/office/mac/drawingml/2011/main" xmlns="" val="1"/>
+              <ma14:placeholderFlag xmlns="" xmlns:ma14="http://schemas.microsoft.com/office/mac/drawingml/2011/main" val="1"/>
             </a:ext>
           </a:extLst>
         </p:spPr>
@@ -566,7 +566,7 @@
               </a14:hiddenLine>
             </a:ext>
             <a:ext uri="{FAA26D3D-D897-4be2-8F04-BA451C77F1D7}">
-              <ma14:placeholderFlag xmlns:ma14="http://schemas.microsoft.com/office/mac/drawingml/2011/main" xmlns="" val="1"/>
+              <ma14:placeholderFlag xmlns="" xmlns:ma14="http://schemas.microsoft.com/office/mac/drawingml/2011/main" val="1"/>
             </a:ext>
           </a:extLst>
         </p:spPr>
@@ -1152,7 +1152,7 @@
           <a:p>
             <a:fld id="{EEE7C04C-7AF8-1445-A186-502B631B934F}" type="datetimeFigureOut">
               <a:rPr lang="en-US" smtClean="0"/>
-              <a:t>9/16/22</a:t>
+              <a:t>7/8/23</a:t>
             </a:fld>
             <a:endParaRPr lang="en-US"/>
           </a:p>
@@ -1317,7 +1317,7 @@
           <a:p>
             <a:fld id="{EEE7C04C-7AF8-1445-A186-502B631B934F}" type="datetimeFigureOut">
               <a:rPr lang="en-US" smtClean="0"/>
-              <a:t>9/16/22</a:t>
+              <a:t>7/8/23</a:t>
             </a:fld>
             <a:endParaRPr lang="en-US"/>
           </a:p>
@@ -1492,7 +1492,7 @@
           <a:p>
             <a:fld id="{EEE7C04C-7AF8-1445-A186-502B631B934F}" type="datetimeFigureOut">
               <a:rPr lang="en-US" smtClean="0"/>
-              <a:t>9/16/22</a:t>
+              <a:t>7/8/23</a:t>
             </a:fld>
             <a:endParaRPr lang="en-US"/>
           </a:p>
@@ -1657,7 +1657,7 @@
           <a:p>
             <a:fld id="{EEE7C04C-7AF8-1445-A186-502B631B934F}" type="datetimeFigureOut">
               <a:rPr lang="en-US" smtClean="0"/>
-              <a:t>9/16/22</a:t>
+              <a:t>7/8/23</a:t>
             </a:fld>
             <a:endParaRPr lang="en-US"/>
           </a:p>
@@ -1898,7 +1898,7 @@
           <a:p>
             <a:fld id="{EEE7C04C-7AF8-1445-A186-502B631B934F}" type="datetimeFigureOut">
               <a:rPr lang="en-US" smtClean="0"/>
-              <a:t>9/16/22</a:t>
+              <a:t>7/8/23</a:t>
             </a:fld>
             <a:endParaRPr lang="en-US"/>
           </a:p>
@@ -2125,7 +2125,7 @@
           <a:p>
             <a:fld id="{EEE7C04C-7AF8-1445-A186-502B631B934F}" type="datetimeFigureOut">
               <a:rPr lang="en-US" smtClean="0"/>
-              <a:t>9/16/22</a:t>
+              <a:t>7/8/23</a:t>
             </a:fld>
             <a:endParaRPr lang="en-US"/>
           </a:p>
@@ -2487,7 +2487,7 @@
           <a:p>
             <a:fld id="{EEE7C04C-7AF8-1445-A186-502B631B934F}" type="datetimeFigureOut">
               <a:rPr lang="en-US" smtClean="0"/>
-              <a:t>9/16/22</a:t>
+              <a:t>7/8/23</a:t>
             </a:fld>
             <a:endParaRPr lang="en-US"/>
           </a:p>
@@ -2600,7 +2600,7 @@
           <a:p>
             <a:fld id="{EEE7C04C-7AF8-1445-A186-502B631B934F}" type="datetimeFigureOut">
               <a:rPr lang="en-US" smtClean="0"/>
-              <a:t>9/16/22</a:t>
+              <a:t>7/8/23</a:t>
             </a:fld>
             <a:endParaRPr lang="en-US"/>
           </a:p>
@@ -2690,7 +2690,7 @@
           <a:p>
             <a:fld id="{EEE7C04C-7AF8-1445-A186-502B631B934F}" type="datetimeFigureOut">
               <a:rPr lang="en-US" smtClean="0"/>
-              <a:t>9/16/22</a:t>
+              <a:t>7/8/23</a:t>
             </a:fld>
             <a:endParaRPr lang="en-US"/>
           </a:p>
@@ -2962,7 +2962,7 @@
           <a:p>
             <a:fld id="{EEE7C04C-7AF8-1445-A186-502B631B934F}" type="datetimeFigureOut">
               <a:rPr lang="en-US" smtClean="0"/>
-              <a:t>9/16/22</a:t>
+              <a:t>7/8/23</a:t>
             </a:fld>
             <a:endParaRPr lang="en-US"/>
           </a:p>
@@ -3214,7 +3214,7 @@
           <a:p>
             <a:fld id="{EEE7C04C-7AF8-1445-A186-502B631B934F}" type="datetimeFigureOut">
               <a:rPr lang="en-US" smtClean="0"/>
-              <a:t>9/16/22</a:t>
+              <a:t>7/8/23</a:t>
             </a:fld>
             <a:endParaRPr lang="en-US"/>
           </a:p>
@@ -3421,7 +3421,7 @@
           <a:p>
             <a:fld id="{EEE7C04C-7AF8-1445-A186-502B631B934F}" type="datetimeFigureOut">
               <a:rPr lang="en-US" smtClean="0"/>
-              <a:t>9/16/22</a:t>
+              <a:t>7/8/23</a:t>
             </a:fld>
             <a:endParaRPr lang="en-US"/>
           </a:p>
@@ -5811,12 +5811,8 @@
               <a:t>en</a:t>
             </a:r>
             <a:r>
-              <a:rPr lang="en-US"/>
-              <a:t>/4.0/</a:t>
-            </a:r>
-            <a:r>
               <a:rPr lang="en-US" dirty="0"/>
-              <a:t>ref/models/fields/#field-types</a:t>
+              <a:t>/4.2/ref/models/fields/#field-types</a:t>
             </a:r>
           </a:p>
         </p:txBody>

</xml_diff>